<commit_message>
touchup, finished editing powerpoint
</commit_message>
<xml_diff>
--- a/MVC Paradigm in Vanilla JS.pptx
+++ b/MVC Paradigm in Vanilla JS.pptx
@@ -4,11 +4,17 @@
   <p:sldMasterIdLst>
     <p:sldMasterId id="2147483648" r:id="rId1"/>
   </p:sldMasterIdLst>
+  <p:notesMasterIdLst>
+    <p:notesMasterId r:id="rId9"/>
+  </p:notesMasterIdLst>
   <p:sldIdLst>
     <p:sldId id="256" r:id="rId2"/>
     <p:sldId id="257" r:id="rId3"/>
-    <p:sldId id="258" r:id="rId4"/>
-    <p:sldId id="259" r:id="rId5"/>
+    <p:sldId id="263" r:id="rId4"/>
+    <p:sldId id="258" r:id="rId5"/>
+    <p:sldId id="260" r:id="rId6"/>
+    <p:sldId id="262" r:id="rId7"/>
+    <p:sldId id="261" r:id="rId8"/>
   </p:sldIdLst>
   <p:sldSz cx="12192000" cy="6858000"/>
   <p:notesSz cx="6858000" cy="9144000"/>
@@ -107,7 +113,380 @@
       </a:defRPr>
     </a:lvl9pPr>
   </p:defaultTextStyle>
+  <p:extLst>
+    <p:ext uri="{521415D9-36F7-43E2-AB2F-B90AF26B5E84}">
+      <p14:sectionLst xmlns:p14="http://schemas.microsoft.com/office/powerpoint/2010/main">
+        <p14:section name="Default Section" id="{C7A63862-F838-4914-BA8C-A88237879330}">
+          <p14:sldIdLst>
+            <p14:sldId id="256"/>
+            <p14:sldId id="257"/>
+            <p14:sldId id="263"/>
+          </p14:sldIdLst>
+        </p14:section>
+        <p14:section name="Untitled Section" id="{69E712C4-1BFA-4994-B8EA-E9776799588B}">
+          <p14:sldIdLst>
+            <p14:sldId id="258"/>
+            <p14:sldId id="260"/>
+            <p14:sldId id="262"/>
+            <p14:sldId id="261"/>
+          </p14:sldIdLst>
+        </p14:section>
+      </p14:sectionLst>
+    </p:ext>
+    <p:ext uri="{EFAFB233-063F-42B5-8137-9DF3F51BA10A}">
+      <p15:sldGuideLst xmlns:p15="http://schemas.microsoft.com/office/powerpoint/2012/main"/>
+    </p:ext>
+  </p:extLst>
 </p:presentation>
+</file>
+
+<file path=ppt/notesMasters/notesMaster1.xml><?xml version="1.0" encoding="utf-8"?>
+<p:notesMaster xmlns:a="http://schemas.openxmlformats.org/drawingml/2006/main" xmlns:r="http://schemas.openxmlformats.org/officeDocument/2006/relationships" xmlns:p="http://schemas.openxmlformats.org/presentationml/2006/main">
+  <p:cSld>
+    <p:bg>
+      <p:bgRef idx="1001">
+        <a:schemeClr val="bg1"/>
+      </p:bgRef>
+    </p:bg>
+    <p:spTree>
+      <p:nvGrpSpPr>
+        <p:cNvPr id="1" name=""/>
+        <p:cNvGrpSpPr/>
+        <p:nvPr/>
+      </p:nvGrpSpPr>
+      <p:grpSpPr>
+        <a:xfrm>
+          <a:off x="0" y="0"/>
+          <a:ext cx="0" cy="0"/>
+          <a:chOff x="0" y="0"/>
+          <a:chExt cx="0" cy="0"/>
+        </a:xfrm>
+      </p:grpSpPr>
+      <p:sp>
+        <p:nvSpPr>
+          <p:cNvPr id="2" name="Header Placeholder 1"/>
+          <p:cNvSpPr>
+            <a:spLocks noGrp="1"/>
+          </p:cNvSpPr>
+          <p:nvPr>
+            <p:ph type="hdr" sz="quarter"/>
+          </p:nvPr>
+        </p:nvSpPr>
+        <p:spPr>
+          <a:xfrm>
+            <a:off x="0" y="0"/>
+            <a:ext cx="2971800" cy="458788"/>
+          </a:xfrm>
+          <a:prstGeom prst="rect">
+            <a:avLst/>
+          </a:prstGeom>
+        </p:spPr>
+        <p:txBody>
+          <a:bodyPr vert="horz" lIns="91440" tIns="45720" rIns="91440" bIns="45720" rtlCol="0"/>
+          <a:lstStyle>
+            <a:lvl1pPr algn="l">
+              <a:defRPr sz="1200"/>
+            </a:lvl1pPr>
+          </a:lstStyle>
+          <a:p>
+            <a:endParaRPr lang="en-US"/>
+          </a:p>
+        </p:txBody>
+      </p:sp>
+      <p:sp>
+        <p:nvSpPr>
+          <p:cNvPr id="3" name="Date Placeholder 2"/>
+          <p:cNvSpPr>
+            <a:spLocks noGrp="1"/>
+          </p:cNvSpPr>
+          <p:nvPr>
+            <p:ph type="dt" idx="1"/>
+          </p:nvPr>
+        </p:nvSpPr>
+        <p:spPr>
+          <a:xfrm>
+            <a:off x="3884613" y="0"/>
+            <a:ext cx="2971800" cy="458788"/>
+          </a:xfrm>
+          <a:prstGeom prst="rect">
+            <a:avLst/>
+          </a:prstGeom>
+        </p:spPr>
+        <p:txBody>
+          <a:bodyPr vert="horz" lIns="91440" tIns="45720" rIns="91440" bIns="45720" rtlCol="0"/>
+          <a:lstStyle>
+            <a:lvl1pPr algn="r">
+              <a:defRPr sz="1200"/>
+            </a:lvl1pPr>
+          </a:lstStyle>
+          <a:p>
+            <a:fld id="{33086FB6-F1DC-4E8C-A81D-2013D3C26898}" type="datetimeFigureOut">
+              <a:rPr lang="en-US" smtClean="0"/>
+              <a:t>10/18/2019</a:t>
+            </a:fld>
+            <a:endParaRPr lang="en-US"/>
+          </a:p>
+        </p:txBody>
+      </p:sp>
+      <p:sp>
+        <p:nvSpPr>
+          <p:cNvPr id="4" name="Slide Image Placeholder 3"/>
+          <p:cNvSpPr>
+            <a:spLocks noGrp="1" noRot="1" noChangeAspect="1"/>
+          </p:cNvSpPr>
+          <p:nvPr>
+            <p:ph type="sldImg" idx="2"/>
+          </p:nvPr>
+        </p:nvSpPr>
+        <p:spPr>
+          <a:xfrm>
+            <a:off x="685800" y="1143000"/>
+            <a:ext cx="5486400" cy="3086100"/>
+          </a:xfrm>
+          <a:prstGeom prst="rect">
+            <a:avLst/>
+          </a:prstGeom>
+          <a:noFill/>
+          <a:ln w="12700">
+            <a:solidFill>
+              <a:prstClr val="black"/>
+            </a:solidFill>
+          </a:ln>
+        </p:spPr>
+        <p:txBody>
+          <a:bodyPr vert="horz" lIns="91440" tIns="45720" rIns="91440" bIns="45720" rtlCol="0" anchor="ctr"/>
+          <a:lstStyle/>
+          <a:p>
+            <a:endParaRPr lang="en-US"/>
+          </a:p>
+        </p:txBody>
+      </p:sp>
+      <p:sp>
+        <p:nvSpPr>
+          <p:cNvPr id="5" name="Notes Placeholder 4"/>
+          <p:cNvSpPr>
+            <a:spLocks noGrp="1"/>
+          </p:cNvSpPr>
+          <p:nvPr>
+            <p:ph type="body" sz="quarter" idx="3"/>
+          </p:nvPr>
+        </p:nvSpPr>
+        <p:spPr>
+          <a:xfrm>
+            <a:off x="685800" y="4400550"/>
+            <a:ext cx="5486400" cy="3600450"/>
+          </a:xfrm>
+          <a:prstGeom prst="rect">
+            <a:avLst/>
+          </a:prstGeom>
+        </p:spPr>
+        <p:txBody>
+          <a:bodyPr vert="horz" lIns="91440" tIns="45720" rIns="91440" bIns="45720" rtlCol="0"/>
+          <a:lstStyle/>
+          <a:p>
+            <a:pPr lvl="0"/>
+            <a:r>
+              <a:rPr lang="en-US"/>
+              <a:t>Click to edit Master text styles</a:t>
+            </a:r>
+          </a:p>
+          <a:p>
+            <a:pPr lvl="1"/>
+            <a:r>
+              <a:rPr lang="en-US"/>
+              <a:t>Second level</a:t>
+            </a:r>
+          </a:p>
+          <a:p>
+            <a:pPr lvl="2"/>
+            <a:r>
+              <a:rPr lang="en-US"/>
+              <a:t>Third level</a:t>
+            </a:r>
+          </a:p>
+          <a:p>
+            <a:pPr lvl="3"/>
+            <a:r>
+              <a:rPr lang="en-US"/>
+              <a:t>Fourth level</a:t>
+            </a:r>
+          </a:p>
+          <a:p>
+            <a:pPr lvl="4"/>
+            <a:r>
+              <a:rPr lang="en-US"/>
+              <a:t>Fifth level</a:t>
+            </a:r>
+          </a:p>
+        </p:txBody>
+      </p:sp>
+      <p:sp>
+        <p:nvSpPr>
+          <p:cNvPr id="6" name="Footer Placeholder 5"/>
+          <p:cNvSpPr>
+            <a:spLocks noGrp="1"/>
+          </p:cNvSpPr>
+          <p:nvPr>
+            <p:ph type="ftr" sz="quarter" idx="4"/>
+          </p:nvPr>
+        </p:nvSpPr>
+        <p:spPr>
+          <a:xfrm>
+            <a:off x="0" y="8685213"/>
+            <a:ext cx="2971800" cy="458787"/>
+          </a:xfrm>
+          <a:prstGeom prst="rect">
+            <a:avLst/>
+          </a:prstGeom>
+        </p:spPr>
+        <p:txBody>
+          <a:bodyPr vert="horz" lIns="91440" tIns="45720" rIns="91440" bIns="45720" rtlCol="0" anchor="b"/>
+          <a:lstStyle>
+            <a:lvl1pPr algn="l">
+              <a:defRPr sz="1200"/>
+            </a:lvl1pPr>
+          </a:lstStyle>
+          <a:p>
+            <a:endParaRPr lang="en-US"/>
+          </a:p>
+        </p:txBody>
+      </p:sp>
+      <p:sp>
+        <p:nvSpPr>
+          <p:cNvPr id="7" name="Slide Number Placeholder 6"/>
+          <p:cNvSpPr>
+            <a:spLocks noGrp="1"/>
+          </p:cNvSpPr>
+          <p:nvPr>
+            <p:ph type="sldNum" sz="quarter" idx="5"/>
+          </p:nvPr>
+        </p:nvSpPr>
+        <p:spPr>
+          <a:xfrm>
+            <a:off x="3884613" y="8685213"/>
+            <a:ext cx="2971800" cy="458787"/>
+          </a:xfrm>
+          <a:prstGeom prst="rect">
+            <a:avLst/>
+          </a:prstGeom>
+        </p:spPr>
+        <p:txBody>
+          <a:bodyPr vert="horz" lIns="91440" tIns="45720" rIns="91440" bIns="45720" rtlCol="0" anchor="b"/>
+          <a:lstStyle>
+            <a:lvl1pPr algn="r">
+              <a:defRPr sz="1200"/>
+            </a:lvl1pPr>
+          </a:lstStyle>
+          <a:p>
+            <a:fld id="{58A3F40D-4330-425D-A28C-968CAA1FBA4A}" type="slidenum">
+              <a:rPr lang="en-US" smtClean="0"/>
+              <a:t>‹#›</a:t>
+            </a:fld>
+            <a:endParaRPr lang="en-US"/>
+          </a:p>
+        </p:txBody>
+      </p:sp>
+    </p:spTree>
+    <p:extLst>
+      <p:ext uri="{BB962C8B-B14F-4D97-AF65-F5344CB8AC3E}">
+        <p14:creationId xmlns:p14="http://schemas.microsoft.com/office/powerpoint/2010/main" val="1541721118"/>
+      </p:ext>
+    </p:extLst>
+  </p:cSld>
+  <p:clrMap bg1="lt1" tx1="dk1" bg2="lt2" tx2="dk2" accent1="accent1" accent2="accent2" accent3="accent3" accent4="accent4" accent5="accent5" accent6="accent6" hlink="hlink" folHlink="folHlink"/>
+  <p:notesStyle>
+    <a:lvl1pPr marL="0" algn="l" defTabSz="914400" rtl="0" eaLnBrk="1" latinLnBrk="0" hangingPunct="1">
+      <a:defRPr sz="1200" kern="1200">
+        <a:solidFill>
+          <a:schemeClr val="tx1"/>
+        </a:solidFill>
+        <a:latin typeface="+mn-lt"/>
+        <a:ea typeface="+mn-ea"/>
+        <a:cs typeface="+mn-cs"/>
+      </a:defRPr>
+    </a:lvl1pPr>
+    <a:lvl2pPr marL="457200" algn="l" defTabSz="914400" rtl="0" eaLnBrk="1" latinLnBrk="0" hangingPunct="1">
+      <a:defRPr sz="1200" kern="1200">
+        <a:solidFill>
+          <a:schemeClr val="tx1"/>
+        </a:solidFill>
+        <a:latin typeface="+mn-lt"/>
+        <a:ea typeface="+mn-ea"/>
+        <a:cs typeface="+mn-cs"/>
+      </a:defRPr>
+    </a:lvl2pPr>
+    <a:lvl3pPr marL="914400" algn="l" defTabSz="914400" rtl="0" eaLnBrk="1" latinLnBrk="0" hangingPunct="1">
+      <a:defRPr sz="1200" kern="1200">
+        <a:solidFill>
+          <a:schemeClr val="tx1"/>
+        </a:solidFill>
+        <a:latin typeface="+mn-lt"/>
+        <a:ea typeface="+mn-ea"/>
+        <a:cs typeface="+mn-cs"/>
+      </a:defRPr>
+    </a:lvl3pPr>
+    <a:lvl4pPr marL="1371600" algn="l" defTabSz="914400" rtl="0" eaLnBrk="1" latinLnBrk="0" hangingPunct="1">
+      <a:defRPr sz="1200" kern="1200">
+        <a:solidFill>
+          <a:schemeClr val="tx1"/>
+        </a:solidFill>
+        <a:latin typeface="+mn-lt"/>
+        <a:ea typeface="+mn-ea"/>
+        <a:cs typeface="+mn-cs"/>
+      </a:defRPr>
+    </a:lvl4pPr>
+    <a:lvl5pPr marL="1828800" algn="l" defTabSz="914400" rtl="0" eaLnBrk="1" latinLnBrk="0" hangingPunct="1">
+      <a:defRPr sz="1200" kern="1200">
+        <a:solidFill>
+          <a:schemeClr val="tx1"/>
+        </a:solidFill>
+        <a:latin typeface="+mn-lt"/>
+        <a:ea typeface="+mn-ea"/>
+        <a:cs typeface="+mn-cs"/>
+      </a:defRPr>
+    </a:lvl5pPr>
+    <a:lvl6pPr marL="2286000" algn="l" defTabSz="914400" rtl="0" eaLnBrk="1" latinLnBrk="0" hangingPunct="1">
+      <a:defRPr sz="1200" kern="1200">
+        <a:solidFill>
+          <a:schemeClr val="tx1"/>
+        </a:solidFill>
+        <a:latin typeface="+mn-lt"/>
+        <a:ea typeface="+mn-ea"/>
+        <a:cs typeface="+mn-cs"/>
+      </a:defRPr>
+    </a:lvl6pPr>
+    <a:lvl7pPr marL="2743200" algn="l" defTabSz="914400" rtl="0" eaLnBrk="1" latinLnBrk="0" hangingPunct="1">
+      <a:defRPr sz="1200" kern="1200">
+        <a:solidFill>
+          <a:schemeClr val="tx1"/>
+        </a:solidFill>
+        <a:latin typeface="+mn-lt"/>
+        <a:ea typeface="+mn-ea"/>
+        <a:cs typeface="+mn-cs"/>
+      </a:defRPr>
+    </a:lvl7pPr>
+    <a:lvl8pPr marL="3200400" algn="l" defTabSz="914400" rtl="0" eaLnBrk="1" latinLnBrk="0" hangingPunct="1">
+      <a:defRPr sz="1200" kern="1200">
+        <a:solidFill>
+          <a:schemeClr val="tx1"/>
+        </a:solidFill>
+        <a:latin typeface="+mn-lt"/>
+        <a:ea typeface="+mn-ea"/>
+        <a:cs typeface="+mn-cs"/>
+      </a:defRPr>
+    </a:lvl8pPr>
+    <a:lvl9pPr marL="3657600" algn="l" defTabSz="914400" rtl="0" eaLnBrk="1" latinLnBrk="0" hangingPunct="1">
+      <a:defRPr sz="1200" kern="1200">
+        <a:solidFill>
+          <a:schemeClr val="tx1"/>
+        </a:solidFill>
+        <a:latin typeface="+mn-lt"/>
+        <a:ea typeface="+mn-ea"/>
+        <a:cs typeface="+mn-cs"/>
+      </a:defRPr>
+    </a:lvl9pPr>
+  </p:notesStyle>
+</p:notesMaster>
 </file>
 
 <file path=ppt/slideLayouts/slideLayout1.xml><?xml version="1.0" encoding="utf-8"?>
@@ -255,9 +634,9 @@
           <a:bodyPr/>
           <a:lstStyle/>
           <a:p>
-            <a:fld id="{4675346C-4016-4D23-AD0A-F4D10EF81453}" type="datetimeFigureOut">
+            <a:fld id="{D2BDB18D-199D-4F31-B045-44FDA016CAA6}" type="datetime1">
               <a:rPr lang="en-US" smtClean="0"/>
-              <a:t>10/14/2019</a:t>
+              <a:t>10/18/2019</a:t>
             </a:fld>
             <a:endParaRPr lang="en-US"/>
           </a:p>
@@ -284,7 +663,10 @@
           <a:bodyPr/>
           <a:lstStyle/>
           <a:p>
-            <a:endParaRPr lang="en-US"/>
+            <a:r>
+              <a:rPr lang="en-US"/>
+              <a:t>https://www.sitepoint.com/mvc-design-pattern-javascript/</a:t>
+            </a:r>
           </a:p>
         </p:txBody>
       </p:sp>
@@ -453,9 +835,9 @@
           <a:bodyPr/>
           <a:lstStyle/>
           <a:p>
-            <a:fld id="{4675346C-4016-4D23-AD0A-F4D10EF81453}" type="datetimeFigureOut">
+            <a:fld id="{961B2F2F-4AB1-4029-8647-31C2EC9CBE53}" type="datetime1">
               <a:rPr lang="en-US" smtClean="0"/>
-              <a:t>10/14/2019</a:t>
+              <a:t>10/18/2019</a:t>
             </a:fld>
             <a:endParaRPr lang="en-US"/>
           </a:p>
@@ -482,7 +864,10 @@
           <a:bodyPr/>
           <a:lstStyle/>
           <a:p>
-            <a:endParaRPr lang="en-US"/>
+            <a:r>
+              <a:rPr lang="en-US"/>
+              <a:t>https://www.sitepoint.com/mvc-design-pattern-javascript/</a:t>
+            </a:r>
           </a:p>
         </p:txBody>
       </p:sp>
@@ -661,9 +1046,9 @@
           <a:bodyPr/>
           <a:lstStyle/>
           <a:p>
-            <a:fld id="{4675346C-4016-4D23-AD0A-F4D10EF81453}" type="datetimeFigureOut">
+            <a:fld id="{9E9B8BC5-9FDC-4DE1-A9DD-89AAD711A16F}" type="datetime1">
               <a:rPr lang="en-US" smtClean="0"/>
-              <a:t>10/14/2019</a:t>
+              <a:t>10/18/2019</a:t>
             </a:fld>
             <a:endParaRPr lang="en-US"/>
           </a:p>
@@ -690,7 +1075,10 @@
           <a:bodyPr/>
           <a:lstStyle/>
           <a:p>
-            <a:endParaRPr lang="en-US"/>
+            <a:r>
+              <a:rPr lang="en-US"/>
+              <a:t>https://www.sitepoint.com/mvc-design-pattern-javascript/</a:t>
+            </a:r>
           </a:p>
         </p:txBody>
       </p:sp>
@@ -859,9 +1247,9 @@
           <a:bodyPr/>
           <a:lstStyle/>
           <a:p>
-            <a:fld id="{4675346C-4016-4D23-AD0A-F4D10EF81453}" type="datetimeFigureOut">
+            <a:fld id="{6C2A4343-FC64-4989-957E-DA86EC1EE460}" type="datetime1">
               <a:rPr lang="en-US" smtClean="0"/>
-              <a:t>10/14/2019</a:t>
+              <a:t>10/18/2019</a:t>
             </a:fld>
             <a:endParaRPr lang="en-US"/>
           </a:p>
@@ -888,7 +1276,10 @@
           <a:bodyPr/>
           <a:lstStyle/>
           <a:p>
-            <a:endParaRPr lang="en-US"/>
+            <a:r>
+              <a:rPr lang="en-US"/>
+              <a:t>https://www.sitepoint.com/mvc-design-pattern-javascript/</a:t>
+            </a:r>
           </a:p>
         </p:txBody>
       </p:sp>
@@ -1134,9 +1525,9 @@
           <a:bodyPr/>
           <a:lstStyle/>
           <a:p>
-            <a:fld id="{4675346C-4016-4D23-AD0A-F4D10EF81453}" type="datetimeFigureOut">
+            <a:fld id="{13CC65AB-6969-4DEE-9FAE-3D0AF6308539}" type="datetime1">
               <a:rPr lang="en-US" smtClean="0"/>
-              <a:t>10/14/2019</a:t>
+              <a:t>10/18/2019</a:t>
             </a:fld>
             <a:endParaRPr lang="en-US"/>
           </a:p>
@@ -1163,7 +1554,10 @@
           <a:bodyPr/>
           <a:lstStyle/>
           <a:p>
-            <a:endParaRPr lang="en-US"/>
+            <a:r>
+              <a:rPr lang="en-US"/>
+              <a:t>https://www.sitepoint.com/mvc-design-pattern-javascript/</a:t>
+            </a:r>
           </a:p>
         </p:txBody>
       </p:sp>
@@ -1399,9 +1793,9 @@
           <a:bodyPr/>
           <a:lstStyle/>
           <a:p>
-            <a:fld id="{4675346C-4016-4D23-AD0A-F4D10EF81453}" type="datetimeFigureOut">
+            <a:fld id="{3A1524AF-A516-42E9-B589-49280B135BFF}" type="datetime1">
               <a:rPr lang="en-US" smtClean="0"/>
-              <a:t>10/14/2019</a:t>
+              <a:t>10/18/2019</a:t>
             </a:fld>
             <a:endParaRPr lang="en-US"/>
           </a:p>
@@ -1428,7 +1822,10 @@
           <a:bodyPr/>
           <a:lstStyle/>
           <a:p>
-            <a:endParaRPr lang="en-US"/>
+            <a:r>
+              <a:rPr lang="en-US"/>
+              <a:t>https://www.sitepoint.com/mvc-design-pattern-javascript/</a:t>
+            </a:r>
           </a:p>
         </p:txBody>
       </p:sp>
@@ -1811,9 +2208,9 @@
           <a:bodyPr/>
           <a:lstStyle/>
           <a:p>
-            <a:fld id="{4675346C-4016-4D23-AD0A-F4D10EF81453}" type="datetimeFigureOut">
+            <a:fld id="{9A8C3D0B-B2DE-4353-8132-B501B15A9120}" type="datetime1">
               <a:rPr lang="en-US" smtClean="0"/>
-              <a:t>10/14/2019</a:t>
+              <a:t>10/18/2019</a:t>
             </a:fld>
             <a:endParaRPr lang="en-US"/>
           </a:p>
@@ -1840,7 +2237,10 @@
           <a:bodyPr/>
           <a:lstStyle/>
           <a:p>
-            <a:endParaRPr lang="en-US"/>
+            <a:r>
+              <a:rPr lang="en-US"/>
+              <a:t>https://www.sitepoint.com/mvc-design-pattern-javascript/</a:t>
+            </a:r>
           </a:p>
         </p:txBody>
       </p:sp>
@@ -1952,9 +2352,9 @@
           <a:bodyPr/>
           <a:lstStyle/>
           <a:p>
-            <a:fld id="{4675346C-4016-4D23-AD0A-F4D10EF81453}" type="datetimeFigureOut">
+            <a:fld id="{5B63866C-3C65-46C3-B873-FEF83701EFE0}" type="datetime1">
               <a:rPr lang="en-US" smtClean="0"/>
-              <a:t>10/14/2019</a:t>
+              <a:t>10/18/2019</a:t>
             </a:fld>
             <a:endParaRPr lang="en-US"/>
           </a:p>
@@ -1981,7 +2381,10 @@
           <a:bodyPr/>
           <a:lstStyle/>
           <a:p>
-            <a:endParaRPr lang="en-US"/>
+            <a:r>
+              <a:rPr lang="en-US"/>
+              <a:t>https://www.sitepoint.com/mvc-design-pattern-javascript/</a:t>
+            </a:r>
           </a:p>
         </p:txBody>
       </p:sp>
@@ -2065,9 +2468,9 @@
           <a:bodyPr/>
           <a:lstStyle/>
           <a:p>
-            <a:fld id="{4675346C-4016-4D23-AD0A-F4D10EF81453}" type="datetimeFigureOut">
+            <a:fld id="{927B4C95-6B7B-4CAA-97C8-116D549E52EB}" type="datetime1">
               <a:rPr lang="en-US" smtClean="0"/>
-              <a:t>10/14/2019</a:t>
+              <a:t>10/18/2019</a:t>
             </a:fld>
             <a:endParaRPr lang="en-US"/>
           </a:p>
@@ -2094,7 +2497,10 @@
           <a:bodyPr/>
           <a:lstStyle/>
           <a:p>
-            <a:endParaRPr lang="en-US"/>
+            <a:r>
+              <a:rPr lang="en-US"/>
+              <a:t>https://www.sitepoint.com/mvc-design-pattern-javascript/</a:t>
+            </a:r>
           </a:p>
         </p:txBody>
       </p:sp>
@@ -2376,9 +2782,9 @@
           <a:bodyPr/>
           <a:lstStyle/>
           <a:p>
-            <a:fld id="{4675346C-4016-4D23-AD0A-F4D10EF81453}" type="datetimeFigureOut">
+            <a:fld id="{F61243EE-696F-4DA7-9A1D-20D39DF2132B}" type="datetime1">
               <a:rPr lang="en-US" smtClean="0"/>
-              <a:t>10/14/2019</a:t>
+              <a:t>10/18/2019</a:t>
             </a:fld>
             <a:endParaRPr lang="en-US"/>
           </a:p>
@@ -2405,7 +2811,10 @@
           <a:bodyPr/>
           <a:lstStyle/>
           <a:p>
-            <a:endParaRPr lang="en-US"/>
+            <a:r>
+              <a:rPr lang="en-US"/>
+              <a:t>https://www.sitepoint.com/mvc-design-pattern-javascript/</a:t>
+            </a:r>
           </a:p>
         </p:txBody>
       </p:sp>
@@ -2664,9 +3073,9 @@
           <a:bodyPr/>
           <a:lstStyle/>
           <a:p>
-            <a:fld id="{4675346C-4016-4D23-AD0A-F4D10EF81453}" type="datetimeFigureOut">
+            <a:fld id="{F694FC16-76C3-47E9-84CF-8381E8A189D8}" type="datetime1">
               <a:rPr lang="en-US" smtClean="0"/>
-              <a:t>10/14/2019</a:t>
+              <a:t>10/18/2019</a:t>
             </a:fld>
             <a:endParaRPr lang="en-US"/>
           </a:p>
@@ -2693,7 +3102,10 @@
           <a:bodyPr/>
           <a:lstStyle/>
           <a:p>
-            <a:endParaRPr lang="en-US"/>
+            <a:r>
+              <a:rPr lang="en-US"/>
+              <a:t>https://www.sitepoint.com/mvc-design-pattern-javascript/</a:t>
+            </a:r>
           </a:p>
         </p:txBody>
       </p:sp>
@@ -2905,9 +3317,9 @@
             </a:lvl1pPr>
           </a:lstStyle>
           <a:p>
-            <a:fld id="{4675346C-4016-4D23-AD0A-F4D10EF81453}" type="datetimeFigureOut">
+            <a:fld id="{23CD761A-42C2-47BC-9012-529037CC912F}" type="datetime1">
               <a:rPr lang="en-US" smtClean="0"/>
-              <a:t>10/14/2019</a:t>
+              <a:t>10/18/2019</a:t>
             </a:fld>
             <a:endParaRPr lang="en-US"/>
           </a:p>
@@ -2952,7 +3364,10 @@
             </a:lvl1pPr>
           </a:lstStyle>
           <a:p>
-            <a:endParaRPr lang="en-US"/>
+            <a:r>
+              <a:rPr lang="en-US"/>
+              <a:t>https://www.sitepoint.com/mvc-design-pattern-javascript/</a:t>
+            </a:r>
           </a:p>
         </p:txBody>
       </p:sp>
@@ -3024,6 +3439,7 @@
     <p:sldLayoutId id="2147483658" r:id="rId10"/>
     <p:sldLayoutId id="2147483659" r:id="rId11"/>
   </p:sldLayoutIdLst>
+  <p:hf sldNum="0" hdr="0" dt="0"/>
   <p:txStyles>
     <p:titleStyle>
       <a:lvl1pPr algn="l" defTabSz="914400" rtl="0" eaLnBrk="1" latinLnBrk="0" hangingPunct="1">
@@ -3397,6 +3813,34 @@
           </a:p>
         </p:txBody>
       </p:sp>
+      <p:sp>
+        <p:nvSpPr>
+          <p:cNvPr id="4" name="Footer Placeholder 3">
+            <a:extLst>
+              <a:ext uri="{FF2B5EF4-FFF2-40B4-BE49-F238E27FC236}">
+                <a16:creationId xmlns:a16="http://schemas.microsoft.com/office/drawing/2014/main" id="{ECD2964A-A567-4B19-AB05-FBC67960A42F}"/>
+              </a:ext>
+            </a:extLst>
+          </p:cNvPr>
+          <p:cNvSpPr>
+            <a:spLocks noGrp="1"/>
+          </p:cNvSpPr>
+          <p:nvPr>
+            <p:ph type="ftr" sz="quarter" idx="11"/>
+          </p:nvPr>
+        </p:nvSpPr>
+        <p:spPr/>
+        <p:txBody>
+          <a:bodyPr/>
+          <a:lstStyle/>
+          <a:p>
+            <a:r>
+              <a:rPr lang="en-US"/>
+              <a:t>https://www.sitepoint.com/mvc-design-pattern-javascript/</a:t>
+            </a:r>
+          </a:p>
+        </p:txBody>
+      </p:sp>
     </p:spTree>
     <p:extLst>
       <p:ext uri="{BB962C8B-B14F-4D97-AF65-F5344CB8AC3E}">
@@ -3471,84 +3915,74 @@
             <p:ph idx="1"/>
           </p:nvPr>
         </p:nvSpPr>
-        <p:spPr/>
-        <p:txBody>
-          <a:bodyPr/>
-          <a:lstStyle/>
-          <a:p>
-            <a:pPr marL="0" indent="0">
-              <a:buNone/>
-            </a:pPr>
-            <a:r>
-              <a:rPr lang="en-US" dirty="0"/>
-              <a:t>MVC is one possible programming pattern for organizing your code</a:t>
-            </a:r>
-          </a:p>
-          <a:p>
-            <a:r>
-              <a:rPr lang="en-US" b="1" dirty="0"/>
-              <a:t>Model</a:t>
-            </a:r>
-            <a:r>
-              <a:rPr lang="en-US" dirty="0"/>
-              <a:t> - Manages the data of an application</a:t>
-            </a:r>
-          </a:p>
-          <a:p>
-            <a:r>
-              <a:rPr lang="en-US" b="1" dirty="0"/>
-              <a:t>View</a:t>
-            </a:r>
-            <a:r>
-              <a:rPr lang="en-US" dirty="0"/>
-              <a:t> - A visual representation of the model</a:t>
-            </a:r>
-          </a:p>
-          <a:p>
-            <a:r>
-              <a:rPr lang="en-US" b="1" dirty="0"/>
-              <a:t>Controller</a:t>
-            </a:r>
-            <a:r>
-              <a:rPr lang="en-US" dirty="0"/>
-              <a:t> - Links the user and the system</a:t>
-            </a:r>
-          </a:p>
-          <a:p>
-            <a:endParaRPr lang="en-US" dirty="0"/>
-          </a:p>
-        </p:txBody>
-      </p:sp>
-      <p:pic>
-        <p:nvPicPr>
-          <p:cNvPr id="4" name="Picture 3">
-            <a:extLst>
-              <a:ext uri="{FF2B5EF4-FFF2-40B4-BE49-F238E27FC236}">
-                <a16:creationId xmlns:a16="http://schemas.microsoft.com/office/drawing/2014/main" id="{0CD9887D-9E73-44C5-9D9B-AFDB6EF8322B}"/>
-              </a:ext>
-            </a:extLst>
-          </p:cNvPr>
-          <p:cNvPicPr>
-            <a:picLocks noChangeAspect="1"/>
-          </p:cNvPicPr>
-          <p:nvPr/>
-        </p:nvPicPr>
-        <p:blipFill>
-          <a:blip r:embed="rId2"/>
-          <a:stretch>
-            <a:fillRect/>
-          </a:stretch>
-        </p:blipFill>
         <p:spPr>
           <a:xfrm>
-            <a:off x="933450" y="4001294"/>
-            <a:ext cx="10325100" cy="2381250"/>
+            <a:off x="838200" y="1825625"/>
+            <a:ext cx="10515600" cy="1976599"/>
           </a:xfrm>
-          <a:prstGeom prst="rect">
-            <a:avLst/>
-          </a:prstGeom>
         </p:spPr>
-      </p:pic>
+        <p:txBody>
+          <a:bodyPr>
+            <a:normAutofit fontScale="92500" lnSpcReduction="10000"/>
+          </a:bodyPr>
+          <a:lstStyle/>
+          <a:p>
+            <a:pPr marL="0" indent="0">
+              <a:buNone/>
+            </a:pPr>
+            <a:r>
+              <a:rPr lang="en-US" dirty="0"/>
+              <a:t>MVC is one possible programming pattern for organizing your code, focusing on separation of concerns.</a:t>
+            </a:r>
+          </a:p>
+          <a:p>
+            <a:pPr marL="0" indent="0">
+              <a:buNone/>
+            </a:pPr>
+            <a:r>
+              <a:rPr lang="en-US" dirty="0"/>
+              <a:t>The idea is to make the solution intelligible and inviting.</a:t>
+            </a:r>
+          </a:p>
+          <a:p>
+            <a:pPr marL="0" indent="0">
+              <a:buNone/>
+            </a:pPr>
+            <a:r>
+              <a:rPr lang="en-US" dirty="0"/>
+              <a:t>Any fellow programmer looking to make specific changes can find the right spot with ease.</a:t>
+            </a:r>
+          </a:p>
+        </p:txBody>
+      </p:sp>
+      <p:sp>
+        <p:nvSpPr>
+          <p:cNvPr id="5" name="Footer Placeholder 4">
+            <a:extLst>
+              <a:ext uri="{FF2B5EF4-FFF2-40B4-BE49-F238E27FC236}">
+                <a16:creationId xmlns:a16="http://schemas.microsoft.com/office/drawing/2014/main" id="{3EF21818-2FB0-4B1D-B577-B10F21F51098}"/>
+              </a:ext>
+            </a:extLst>
+          </p:cNvPr>
+          <p:cNvSpPr>
+            <a:spLocks noGrp="1"/>
+          </p:cNvSpPr>
+          <p:nvPr>
+            <p:ph type="ftr" sz="quarter" idx="11"/>
+          </p:nvPr>
+        </p:nvSpPr>
+        <p:spPr/>
+        <p:txBody>
+          <a:bodyPr/>
+          <a:lstStyle/>
+          <a:p>
+            <a:r>
+              <a:rPr lang="en-US"/>
+              <a:t>https://www.sitepoint.com/mvc-design-pattern-javascript/</a:t>
+            </a:r>
+          </a:p>
+        </p:txBody>
+      </p:sp>
     </p:spTree>
     <p:extLst>
       <p:ext uri="{BB962C8B-B14F-4D97-AF65-F5344CB8AC3E}">
@@ -3584,7 +4018,7 @@
           <p:cNvPr id="2" name="Title 1">
             <a:extLst>
               <a:ext uri="{FF2B5EF4-FFF2-40B4-BE49-F238E27FC236}">
-                <a16:creationId xmlns:a16="http://schemas.microsoft.com/office/drawing/2014/main" id="{7B8810EE-5119-42E3-B29A-B3171113C1B6}"/>
+                <a16:creationId xmlns:a16="http://schemas.microsoft.com/office/drawing/2014/main" id="{06EFB173-9261-4CF9-B860-0F4540C71293}"/>
               </a:ext>
             </a:extLst>
           </p:cNvPr>
@@ -3602,136 +4036,122 @@
           <a:p>
             <a:r>
               <a:rPr lang="en-US" dirty="0"/>
-              <a:t>Breakdown:</a:t>
-            </a:r>
-          </a:p>
-        </p:txBody>
-      </p:sp>
-      <p:sp>
-        <p:nvSpPr>
-          <p:cNvPr id="3" name="Content Placeholder 2">
-            <a:extLst>
-              <a:ext uri="{FF2B5EF4-FFF2-40B4-BE49-F238E27FC236}">
-                <a16:creationId xmlns:a16="http://schemas.microsoft.com/office/drawing/2014/main" id="{68FBFA40-1C37-48CA-8EBD-16FE9D8EA059}"/>
-              </a:ext>
-            </a:extLst>
-          </p:cNvPr>
-          <p:cNvSpPr>
-            <a:spLocks noGrp="1"/>
-          </p:cNvSpPr>
+              <a:t>MVC Diagrams</a:t>
+            </a:r>
+          </a:p>
+        </p:txBody>
+      </p:sp>
+      <p:sp>
+        <p:nvSpPr>
+          <p:cNvPr id="4" name="Footer Placeholder 3">
+            <a:extLst>
+              <a:ext uri="{FF2B5EF4-FFF2-40B4-BE49-F238E27FC236}">
+                <a16:creationId xmlns:a16="http://schemas.microsoft.com/office/drawing/2014/main" id="{A5FA501C-5D31-4AAB-A8B1-0663BB26F231}"/>
+              </a:ext>
+            </a:extLst>
+          </p:cNvPr>
+          <p:cNvSpPr>
+            <a:spLocks noGrp="1"/>
+          </p:cNvSpPr>
+          <p:nvPr>
+            <p:ph type="ftr" sz="quarter" idx="11"/>
+          </p:nvPr>
+        </p:nvSpPr>
+        <p:spPr/>
+        <p:txBody>
+          <a:bodyPr/>
+          <a:lstStyle/>
+          <a:p>
+            <a:r>
+              <a:rPr lang="en-US"/>
+              <a:t>https://www.sitepoint.com/mvc-design-pattern-javascript/</a:t>
+            </a:r>
+          </a:p>
+        </p:txBody>
+      </p:sp>
+      <p:pic>
+        <p:nvPicPr>
+          <p:cNvPr id="1026" name="Picture 2">
+            <a:extLst>
+              <a:ext uri="{FF2B5EF4-FFF2-40B4-BE49-F238E27FC236}">
+                <a16:creationId xmlns:a16="http://schemas.microsoft.com/office/drawing/2014/main" id="{5B707283-AA34-45D9-9A19-15AFEBC7B53A}"/>
+              </a:ext>
+            </a:extLst>
+          </p:cNvPr>
+          <p:cNvPicPr>
+            <a:picLocks noGrp="1" noChangeAspect="1" noChangeArrowheads="1"/>
+          </p:cNvPicPr>
           <p:nvPr>
             <p:ph idx="1"/>
           </p:nvPr>
-        </p:nvSpPr>
-        <p:spPr/>
-        <p:txBody>
-          <a:bodyPr>
-            <a:normAutofit lnSpcReduction="10000"/>
-          </a:bodyPr>
-          <a:lstStyle/>
-          <a:p>
-            <a:r>
-              <a:rPr lang="en-US" dirty="0"/>
-              <a:t>The </a:t>
-            </a:r>
-            <a:r>
-              <a:rPr lang="en-US" b="1" dirty="0"/>
-              <a:t>model</a:t>
-            </a:r>
-            <a:r>
-              <a:rPr lang="en-US" dirty="0"/>
-              <a:t> is the data. In this </a:t>
-            </a:r>
-            <a:r>
-              <a:rPr lang="en-US" dirty="0" err="1"/>
-              <a:t>todo</a:t>
-            </a:r>
-            <a:r>
-              <a:rPr lang="en-US" dirty="0"/>
-              <a:t> application, that'll be the actual </a:t>
-            </a:r>
-            <a:r>
-              <a:rPr lang="en-US" dirty="0" err="1"/>
-              <a:t>todos</a:t>
-            </a:r>
-            <a:r>
-              <a:rPr lang="en-US" dirty="0"/>
-              <a:t>, and the methods that will add, edit, or delete them. </a:t>
-            </a:r>
-          </a:p>
-          <a:p>
-            <a:r>
-              <a:rPr lang="en-US" dirty="0"/>
-              <a:t>The </a:t>
-            </a:r>
-            <a:r>
-              <a:rPr lang="en-US" b="1" dirty="0"/>
-              <a:t>view</a:t>
-            </a:r>
-            <a:r>
-              <a:rPr lang="en-US" dirty="0"/>
-              <a:t> is how the data is displayed. In this </a:t>
-            </a:r>
-            <a:r>
-              <a:rPr lang="en-US" dirty="0" err="1"/>
-              <a:t>todo</a:t>
-            </a:r>
-            <a:r>
-              <a:rPr lang="en-US" dirty="0"/>
-              <a:t> application, that will be the rendered HTML in the DOM and CSS.</a:t>
-            </a:r>
-          </a:p>
-          <a:p>
-            <a:r>
-              <a:rPr lang="en-US" dirty="0"/>
-              <a:t>The </a:t>
-            </a:r>
-            <a:r>
-              <a:rPr lang="en-US" b="1" dirty="0"/>
-              <a:t>controller</a:t>
-            </a:r>
-            <a:r>
-              <a:rPr lang="en-US" dirty="0"/>
-              <a:t> connects the model and the view. It takes user input, such as clicking or typing, and handles callbacks for user interactions. The controller is the link between the model (the data ) and the view (what the user sees).</a:t>
-            </a:r>
-          </a:p>
-          <a:p>
-            <a:r>
-              <a:rPr lang="en-US" dirty="0"/>
-              <a:t>Neither the </a:t>
-            </a:r>
-            <a:r>
-              <a:rPr lang="en-US" b="1" dirty="0"/>
-              <a:t>controller</a:t>
-            </a:r>
-            <a:r>
-              <a:rPr lang="en-US" dirty="0"/>
-              <a:t> nor the </a:t>
-            </a:r>
-            <a:r>
-              <a:rPr lang="en-US" b="1" dirty="0"/>
-              <a:t>model</a:t>
-            </a:r>
-            <a:r>
-              <a:rPr lang="en-US" dirty="0"/>
-              <a:t> should know anything about the DOM, HTML elements, CSS, or any of that. Anything relating to it should be in the view.</a:t>
-            </a:r>
-          </a:p>
-          <a:p>
-            <a:endParaRPr lang="en-US" dirty="0"/>
-          </a:p>
-          <a:p>
-            <a:endParaRPr lang="en-US" dirty="0"/>
-          </a:p>
-          <a:p>
-            <a:endParaRPr lang="en-US" dirty="0"/>
-          </a:p>
-        </p:txBody>
-      </p:sp>
+        </p:nvPicPr>
+        <p:blipFill>
+          <a:blip r:embed="rId2">
+            <a:extLst>
+              <a:ext uri="{28A0092B-C50C-407E-A947-70E740481C1C}">
+                <a14:useLocalDpi xmlns:a14="http://schemas.microsoft.com/office/drawing/2010/main" val="0"/>
+              </a:ext>
+            </a:extLst>
+          </a:blip>
+          <a:srcRect/>
+          <a:stretch>
+            <a:fillRect/>
+          </a:stretch>
+        </p:blipFill>
+        <p:spPr bwMode="auto">
+          <a:xfrm>
+            <a:off x="6912276" y="1979357"/>
+            <a:ext cx="4690339" cy="3868466"/>
+          </a:xfrm>
+          <a:prstGeom prst="rect">
+            <a:avLst/>
+          </a:prstGeom>
+          <a:noFill/>
+          <a:extLst>
+            <a:ext uri="{909E8E84-426E-40DD-AFC4-6F175D3DCCD1}">
+              <a14:hiddenFill xmlns:a14="http://schemas.microsoft.com/office/drawing/2010/main">
+                <a:solidFill>
+                  <a:srgbClr val="FFFFFF"/>
+                </a:solidFill>
+              </a14:hiddenFill>
+            </a:ext>
+          </a:extLst>
+        </p:spPr>
+      </p:pic>
+      <p:pic>
+        <p:nvPicPr>
+          <p:cNvPr id="6" name="Picture 5">
+            <a:extLst>
+              <a:ext uri="{FF2B5EF4-FFF2-40B4-BE49-F238E27FC236}">
+                <a16:creationId xmlns:a16="http://schemas.microsoft.com/office/drawing/2014/main" id="{E335E8E3-B6DF-4948-BA91-A427B4002B16}"/>
+              </a:ext>
+            </a:extLst>
+          </p:cNvPr>
+          <p:cNvPicPr>
+            <a:picLocks noChangeAspect="1"/>
+          </p:cNvPicPr>
+          <p:nvPr/>
+        </p:nvPicPr>
+        <p:blipFill>
+          <a:blip r:embed="rId3"/>
+          <a:stretch>
+            <a:fillRect/>
+          </a:stretch>
+        </p:blipFill>
+        <p:spPr>
+          <a:xfrm>
+            <a:off x="862482" y="2312484"/>
+            <a:ext cx="6177460" cy="1424691"/>
+          </a:xfrm>
+          <a:prstGeom prst="rect">
+            <a:avLst/>
+          </a:prstGeom>
+        </p:spPr>
+      </p:pic>
     </p:spTree>
     <p:extLst>
       <p:ext uri="{BB962C8B-B14F-4D97-AF65-F5344CB8AC3E}">
-        <p14:creationId xmlns:p14="http://schemas.microsoft.com/office/powerpoint/2010/main" val="1853188412"/>
+        <p14:creationId xmlns:p14="http://schemas.microsoft.com/office/powerpoint/2010/main" val="2316274739"/>
       </p:ext>
     </p:extLst>
   </p:cSld>
@@ -3763,7 +4183,7 @@
           <p:cNvPr id="2" name="Title 1">
             <a:extLst>
               <a:ext uri="{FF2B5EF4-FFF2-40B4-BE49-F238E27FC236}">
-                <a16:creationId xmlns:a16="http://schemas.microsoft.com/office/drawing/2014/main" id="{A933AE76-E5B2-4B55-AF45-552127ABDE7B}"/>
+                <a16:creationId xmlns:a16="http://schemas.microsoft.com/office/drawing/2014/main" id="{7B8810EE-5119-42E3-B29A-B3171113C1B6}"/>
               </a:ext>
             </a:extLst>
           </p:cNvPr>
@@ -3781,7 +4201,7 @@
           <a:p>
             <a:r>
               <a:rPr lang="en-US" dirty="0"/>
-              <a:t>References and More Resources:</a:t>
+              <a:t>Breakdown:</a:t>
             </a:r>
           </a:p>
         </p:txBody>
@@ -3791,7 +4211,7 @@
           <p:cNvPr id="3" name="Content Placeholder 2">
             <a:extLst>
               <a:ext uri="{FF2B5EF4-FFF2-40B4-BE49-F238E27FC236}">
-                <a16:creationId xmlns:a16="http://schemas.microsoft.com/office/drawing/2014/main" id="{5EDA2B2F-6DD8-4B61-ADA3-F8351F4E0647}"/>
+                <a16:creationId xmlns:a16="http://schemas.microsoft.com/office/drawing/2014/main" id="{68FBFA40-1C37-48CA-8EBD-16FE9D8EA059}"/>
               </a:ext>
             </a:extLst>
           </p:cNvPr>
@@ -3802,16 +4222,104 @@
             <p:ph idx="1"/>
           </p:nvPr>
         </p:nvSpPr>
-        <p:spPr/>
-        <p:txBody>
-          <a:bodyPr/>
-          <a:lstStyle/>
+        <p:spPr>
+          <a:xfrm>
+            <a:off x="838200" y="1825625"/>
+            <a:ext cx="10515600" cy="1887959"/>
+          </a:xfrm>
+        </p:spPr>
+        <p:txBody>
+          <a:bodyPr>
+            <a:normAutofit/>
+          </a:bodyPr>
+          <a:lstStyle/>
+          <a:p>
+            <a:r>
+              <a:rPr lang="en-US" dirty="0"/>
+              <a:t>The </a:t>
+            </a:r>
+            <a:r>
+              <a:rPr lang="en-US" b="1" dirty="0"/>
+              <a:t>model</a:t>
+            </a:r>
+            <a:r>
+              <a:rPr lang="en-US" dirty="0"/>
+              <a:t> is the data, and usually functions that manipulate data</a:t>
+            </a:r>
+          </a:p>
+          <a:p>
+            <a:r>
+              <a:rPr lang="en-US" dirty="0"/>
+              <a:t>The </a:t>
+            </a:r>
+            <a:r>
+              <a:rPr lang="en-US" b="1" dirty="0"/>
+              <a:t>view</a:t>
+            </a:r>
+            <a:r>
+              <a:rPr lang="en-US" dirty="0"/>
+              <a:t> is how the data is displayed: HTML in the DOM and CSS.</a:t>
+            </a:r>
+          </a:p>
+          <a:p>
+            <a:r>
+              <a:rPr lang="en-US" dirty="0"/>
+              <a:t>The </a:t>
+            </a:r>
+            <a:r>
+              <a:rPr lang="en-US" b="1" dirty="0"/>
+              <a:t>controller</a:t>
+            </a:r>
+            <a:r>
+              <a:rPr lang="en-US" dirty="0"/>
+              <a:t> connects the model and the view. </a:t>
+            </a:r>
+          </a:p>
+          <a:p>
+            <a:endParaRPr lang="en-US" dirty="0"/>
+          </a:p>
+          <a:p>
+            <a:endParaRPr lang="en-US" dirty="0"/>
+          </a:p>
+        </p:txBody>
+      </p:sp>
+      <p:sp>
+        <p:nvSpPr>
+          <p:cNvPr id="4" name="Footer Placeholder 3">
+            <a:extLst>
+              <a:ext uri="{FF2B5EF4-FFF2-40B4-BE49-F238E27FC236}">
+                <a16:creationId xmlns:a16="http://schemas.microsoft.com/office/drawing/2014/main" id="{BA8E448C-E775-4657-A5A0-5E649DF7D120}"/>
+              </a:ext>
+            </a:extLst>
+          </p:cNvPr>
+          <p:cNvSpPr>
+            <a:spLocks noGrp="1"/>
+          </p:cNvSpPr>
+          <p:nvPr>
+            <p:ph type="ftr" sz="quarter" idx="11"/>
+          </p:nvPr>
+        </p:nvSpPr>
+        <p:spPr>
+          <a:xfrm>
+            <a:off x="4038600" y="5710336"/>
+            <a:ext cx="4114800" cy="1011140"/>
+          </a:xfrm>
+        </p:spPr>
+        <p:txBody>
+          <a:bodyPr/>
+          <a:lstStyle/>
+          <a:p>
+            <a:r>
+              <a:rPr lang="en-US" b="1" dirty="0"/>
+              <a:t>Sources: </a:t>
+            </a:r>
+          </a:p>
           <a:p>
             <a:r>
               <a:rPr lang="en-US" dirty="0">
                 <a:hlinkClick r:id="rId2"/>
               </a:rPr>
-              <a:t>https://medium.com/@patrickackerman/classic-front-end-mvc-with-vanilla-javascript-7eee550bc702</a:t>
+              <a:t>https://www.sitepoint.com/mvc-design-pattern-javascript/</a:t>
             </a:r>
             <a:endParaRPr lang="en-US" dirty="0"/>
           </a:p>
@@ -3826,10 +4334,616 @@
           </a:p>
         </p:txBody>
       </p:sp>
+      <p:sp>
+        <p:nvSpPr>
+          <p:cNvPr id="5" name="TextBox 4">
+            <a:extLst>
+              <a:ext uri="{FF2B5EF4-FFF2-40B4-BE49-F238E27FC236}">
+                <a16:creationId xmlns:a16="http://schemas.microsoft.com/office/drawing/2014/main" id="{0791F5B7-84B7-43DC-AF7C-7B5D85AC2A01}"/>
+              </a:ext>
+            </a:extLst>
+          </p:cNvPr>
+          <p:cNvSpPr txBox="1"/>
+          <p:nvPr/>
+        </p:nvSpPr>
+        <p:spPr>
+          <a:xfrm>
+            <a:off x="1665513" y="3848521"/>
+            <a:ext cx="8262257" cy="1384995"/>
+          </a:xfrm>
+          <a:prstGeom prst="rect">
+            <a:avLst/>
+          </a:prstGeom>
+          <a:noFill/>
+        </p:spPr>
+        <p:txBody>
+          <a:bodyPr wrap="square" rtlCol="0">
+            <a:spAutoFit/>
+          </a:bodyPr>
+          <a:lstStyle/>
+          <a:p>
+            <a:r>
+              <a:rPr lang="en-US" sz="2800" dirty="0">
+                <a:solidFill>
+                  <a:srgbClr val="C00000"/>
+                </a:solidFill>
+              </a:rPr>
+              <a:t>Neither the </a:t>
+            </a:r>
+            <a:r>
+              <a:rPr lang="en-US" sz="2800" b="1" dirty="0">
+                <a:solidFill>
+                  <a:srgbClr val="C00000"/>
+                </a:solidFill>
+              </a:rPr>
+              <a:t>controller</a:t>
+            </a:r>
+            <a:r>
+              <a:rPr lang="en-US" sz="2800" dirty="0">
+                <a:solidFill>
+                  <a:srgbClr val="C00000"/>
+                </a:solidFill>
+              </a:rPr>
+              <a:t> nor the </a:t>
+            </a:r>
+            <a:r>
+              <a:rPr lang="en-US" sz="2800" b="1" dirty="0">
+                <a:solidFill>
+                  <a:srgbClr val="C00000"/>
+                </a:solidFill>
+              </a:rPr>
+              <a:t>model</a:t>
+            </a:r>
+            <a:r>
+              <a:rPr lang="en-US" sz="2800" dirty="0">
+                <a:solidFill>
+                  <a:srgbClr val="C00000"/>
+                </a:solidFill>
+              </a:rPr>
+              <a:t> should know anything about the DOM, HTML elements, CSS, or any of that. Anything relating to it should be in the view.</a:t>
+            </a:r>
+          </a:p>
+        </p:txBody>
+      </p:sp>
     </p:spTree>
     <p:extLst>
       <p:ext uri="{BB962C8B-B14F-4D97-AF65-F5344CB8AC3E}">
-        <p14:creationId xmlns:p14="http://schemas.microsoft.com/office/powerpoint/2010/main" val="3725261152"/>
+        <p14:creationId xmlns:p14="http://schemas.microsoft.com/office/powerpoint/2010/main" val="1853188412"/>
+      </p:ext>
+    </p:extLst>
+  </p:cSld>
+  <p:clrMapOvr>
+    <a:masterClrMapping/>
+  </p:clrMapOvr>
+</p:sld>
+</file>
+
+<file path=ppt/slides/slide5.xml><?xml version="1.0" encoding="utf-8"?>
+<p:sld xmlns:a="http://schemas.openxmlformats.org/drawingml/2006/main" xmlns:r="http://schemas.openxmlformats.org/officeDocument/2006/relationships" xmlns:p="http://schemas.openxmlformats.org/presentationml/2006/main">
+  <p:cSld>
+    <p:spTree>
+      <p:nvGrpSpPr>
+        <p:cNvPr id="1" name=""/>
+        <p:cNvGrpSpPr/>
+        <p:nvPr/>
+      </p:nvGrpSpPr>
+      <p:grpSpPr>
+        <a:xfrm>
+          <a:off x="0" y="0"/>
+          <a:ext cx="0" cy="0"/>
+          <a:chOff x="0" y="0"/>
+          <a:chExt cx="0" cy="0"/>
+        </a:xfrm>
+      </p:grpSpPr>
+      <p:sp>
+        <p:nvSpPr>
+          <p:cNvPr id="2" name="Title 1">
+            <a:extLst>
+              <a:ext uri="{FF2B5EF4-FFF2-40B4-BE49-F238E27FC236}">
+                <a16:creationId xmlns:a16="http://schemas.microsoft.com/office/drawing/2014/main" id="{B4369D51-BF3F-46B1-BD92-64A988821463}"/>
+              </a:ext>
+            </a:extLst>
+          </p:cNvPr>
+          <p:cNvSpPr>
+            <a:spLocks noGrp="1"/>
+          </p:cNvSpPr>
+          <p:nvPr>
+            <p:ph type="title"/>
+          </p:nvPr>
+        </p:nvSpPr>
+        <p:spPr/>
+        <p:txBody>
+          <a:bodyPr/>
+          <a:lstStyle/>
+          <a:p>
+            <a:r>
+              <a:rPr lang="en-US" dirty="0"/>
+              <a:t>The View</a:t>
+            </a:r>
+          </a:p>
+        </p:txBody>
+      </p:sp>
+      <p:sp>
+        <p:nvSpPr>
+          <p:cNvPr id="3" name="Content Placeholder 2">
+            <a:extLst>
+              <a:ext uri="{FF2B5EF4-FFF2-40B4-BE49-F238E27FC236}">
+                <a16:creationId xmlns:a16="http://schemas.microsoft.com/office/drawing/2014/main" id="{2D0D1570-2082-4CC3-8067-4C7BB2759D2E}"/>
+              </a:ext>
+            </a:extLst>
+          </p:cNvPr>
+          <p:cNvSpPr>
+            <a:spLocks noGrp="1"/>
+          </p:cNvSpPr>
+          <p:nvPr>
+            <p:ph idx="1"/>
+          </p:nvPr>
+        </p:nvSpPr>
+        <p:spPr/>
+        <p:txBody>
+          <a:bodyPr/>
+          <a:lstStyle/>
+          <a:p>
+            <a:r>
+              <a:rPr lang="en-US" dirty="0"/>
+              <a:t>Cares about the DOM. The DOM is the browser API you use to make HTML manipulations. (Document Object Model)</a:t>
+            </a:r>
+          </a:p>
+          <a:p>
+            <a:r>
+              <a:rPr lang="en-US" dirty="0"/>
+              <a:t>In MVC, no other part cares about </a:t>
+            </a:r>
+            <a:r>
+              <a:rPr lang="en-US" i="1" dirty="0"/>
+              <a:t>changing</a:t>
+            </a:r>
+            <a:r>
+              <a:rPr lang="en-US" dirty="0"/>
+              <a:t> the DOM except for the view. The view can attach user events but leaves event handling concerns to the controller. </a:t>
+            </a:r>
+          </a:p>
+          <a:p>
+            <a:r>
+              <a:rPr lang="en-US" dirty="0"/>
+              <a:t>The view’s prime directive is to change the state of what the user sees on the screen. </a:t>
+            </a:r>
+          </a:p>
+          <a:p>
+            <a:r>
+              <a:rPr lang="en-US" dirty="0"/>
+              <a:t>The view is listening to the controller for actions to manipulate the DOM.</a:t>
+            </a:r>
+          </a:p>
+        </p:txBody>
+      </p:sp>
+      <p:sp>
+        <p:nvSpPr>
+          <p:cNvPr id="4" name="Footer Placeholder 3">
+            <a:extLst>
+              <a:ext uri="{FF2B5EF4-FFF2-40B4-BE49-F238E27FC236}">
+                <a16:creationId xmlns:a16="http://schemas.microsoft.com/office/drawing/2014/main" id="{8DAD04EF-D291-45F6-BEF4-66C66D7DF1A4}"/>
+              </a:ext>
+            </a:extLst>
+          </p:cNvPr>
+          <p:cNvSpPr>
+            <a:spLocks noGrp="1"/>
+          </p:cNvSpPr>
+          <p:nvPr>
+            <p:ph type="ftr" sz="quarter" idx="11"/>
+          </p:nvPr>
+        </p:nvSpPr>
+        <p:spPr>
+          <a:xfrm>
+            <a:off x="3996612" y="5994400"/>
+            <a:ext cx="4114800" cy="365125"/>
+          </a:xfrm>
+        </p:spPr>
+        <p:txBody>
+          <a:bodyPr/>
+          <a:lstStyle/>
+          <a:p>
+            <a:r>
+              <a:rPr lang="en-US" b="1" dirty="0"/>
+              <a:t>Sources: </a:t>
+            </a:r>
+          </a:p>
+          <a:p>
+            <a:r>
+              <a:rPr lang="en-US" dirty="0">
+                <a:hlinkClick r:id="rId2"/>
+              </a:rPr>
+              <a:t>https://www.sitepoint.com/mvc-design-pattern-javascript/</a:t>
+            </a:r>
+            <a:endParaRPr lang="en-US" dirty="0"/>
+          </a:p>
+          <a:p>
+            <a:r>
+              <a:rPr lang="en-US" dirty="0">
+                <a:hlinkClick r:id="rId3"/>
+              </a:rPr>
+              <a:t>https://www.taniarascia.com/javascript-mvc-todo-app/</a:t>
+            </a:r>
+            <a:endParaRPr lang="en-US" dirty="0"/>
+          </a:p>
+        </p:txBody>
+      </p:sp>
+    </p:spTree>
+    <p:extLst>
+      <p:ext uri="{BB962C8B-B14F-4D97-AF65-F5344CB8AC3E}">
+        <p14:creationId xmlns:p14="http://schemas.microsoft.com/office/powerpoint/2010/main" val="2085492808"/>
+      </p:ext>
+    </p:extLst>
+  </p:cSld>
+  <p:clrMapOvr>
+    <a:masterClrMapping/>
+  </p:clrMapOvr>
+</p:sld>
+</file>
+
+<file path=ppt/slides/slide6.xml><?xml version="1.0" encoding="utf-8"?>
+<p:sld xmlns:a="http://schemas.openxmlformats.org/drawingml/2006/main" xmlns:r="http://schemas.openxmlformats.org/officeDocument/2006/relationships" xmlns:p="http://schemas.openxmlformats.org/presentationml/2006/main">
+  <p:cSld>
+    <p:spTree>
+      <p:nvGrpSpPr>
+        <p:cNvPr id="1" name=""/>
+        <p:cNvGrpSpPr/>
+        <p:nvPr/>
+      </p:nvGrpSpPr>
+      <p:grpSpPr>
+        <a:xfrm>
+          <a:off x="0" y="0"/>
+          <a:ext cx="0" cy="0"/>
+          <a:chOff x="0" y="0"/>
+          <a:chExt cx="0" cy="0"/>
+        </a:xfrm>
+      </p:grpSpPr>
+      <p:sp>
+        <p:nvSpPr>
+          <p:cNvPr id="2" name="Title 1">
+            <a:extLst>
+              <a:ext uri="{FF2B5EF4-FFF2-40B4-BE49-F238E27FC236}">
+                <a16:creationId xmlns:a16="http://schemas.microsoft.com/office/drawing/2014/main" id="{EE3EB012-1E5B-4036-B6C7-371B7B73C278}"/>
+              </a:ext>
+            </a:extLst>
+          </p:cNvPr>
+          <p:cNvSpPr>
+            <a:spLocks noGrp="1"/>
+          </p:cNvSpPr>
+          <p:nvPr>
+            <p:ph type="title"/>
+          </p:nvPr>
+        </p:nvSpPr>
+        <p:spPr/>
+        <p:txBody>
+          <a:bodyPr/>
+          <a:lstStyle/>
+          <a:p>
+            <a:r>
+              <a:rPr lang="en-US" dirty="0"/>
+              <a:t>The Controller</a:t>
+            </a:r>
+          </a:p>
+        </p:txBody>
+      </p:sp>
+      <p:sp>
+        <p:nvSpPr>
+          <p:cNvPr id="3" name="Content Placeholder 2">
+            <a:extLst>
+              <a:ext uri="{FF2B5EF4-FFF2-40B4-BE49-F238E27FC236}">
+                <a16:creationId xmlns:a16="http://schemas.microsoft.com/office/drawing/2014/main" id="{15625062-4CDC-4188-990F-74CCA28BF6ED}"/>
+              </a:ext>
+            </a:extLst>
+          </p:cNvPr>
+          <p:cNvSpPr>
+            <a:spLocks noGrp="1"/>
+          </p:cNvSpPr>
+          <p:nvPr>
+            <p:ph idx="1"/>
+          </p:nvPr>
+        </p:nvSpPr>
+        <p:spPr/>
+        <p:txBody>
+          <a:bodyPr>
+            <a:normAutofit fontScale="92500" lnSpcReduction="20000"/>
+          </a:bodyPr>
+          <a:lstStyle/>
+          <a:p>
+            <a:r>
+              <a:rPr lang="en-US" dirty="0"/>
+              <a:t>Takes user input, such as clicking or typing, and handles callback functions for user interactions. </a:t>
+            </a:r>
+          </a:p>
+          <a:p>
+            <a:r>
+              <a:rPr lang="en-US" dirty="0"/>
+              <a:t>The controller is the link between the model (the data ) and the view (what the user sees).</a:t>
+            </a:r>
+          </a:p>
+          <a:p>
+            <a:r>
+              <a:rPr lang="en-US" dirty="0"/>
+              <a:t>Client-side specific logic can go in the controller.</a:t>
+            </a:r>
+          </a:p>
+          <a:p>
+            <a:r>
+              <a:rPr lang="en-US" dirty="0"/>
+              <a:t>The controller is the entry point for events and the only mediator between the view and data.</a:t>
+            </a:r>
+          </a:p>
+          <a:p>
+            <a:r>
+              <a:rPr lang="en-US" dirty="0"/>
+              <a:t>When you submit a new </a:t>
+            </a:r>
+            <a:r>
+              <a:rPr lang="en-US" dirty="0" err="1"/>
+              <a:t>todo</a:t>
+            </a:r>
+            <a:r>
+              <a:rPr lang="en-US" dirty="0"/>
+              <a:t>, or click the delete button, or click on the checkbox of a </a:t>
+            </a:r>
+            <a:r>
+              <a:rPr lang="en-US" dirty="0" err="1"/>
+              <a:t>todo</a:t>
+            </a:r>
+            <a:r>
+              <a:rPr lang="en-US" dirty="0"/>
+              <a:t>, an event will be fired. The view must listen for those events because they're user input of the view, but it will dispatch the responsibility of what will happen in response to the event to the controller.</a:t>
+            </a:r>
+            <a:br>
+              <a:rPr lang="en-US" dirty="0"/>
+            </a:br>
+            <a:endParaRPr lang="en-US" dirty="0"/>
+          </a:p>
+        </p:txBody>
+      </p:sp>
+      <p:sp>
+        <p:nvSpPr>
+          <p:cNvPr id="4" name="Footer Placeholder 3">
+            <a:extLst>
+              <a:ext uri="{FF2B5EF4-FFF2-40B4-BE49-F238E27FC236}">
+                <a16:creationId xmlns:a16="http://schemas.microsoft.com/office/drawing/2014/main" id="{E6852DFD-7470-49EE-A215-5D38280B2D1D}"/>
+              </a:ext>
+            </a:extLst>
+          </p:cNvPr>
+          <p:cNvSpPr>
+            <a:spLocks noGrp="1"/>
+          </p:cNvSpPr>
+          <p:nvPr>
+            <p:ph type="ftr" sz="quarter" idx="11"/>
+          </p:nvPr>
+        </p:nvSpPr>
+        <p:spPr>
+          <a:xfrm>
+            <a:off x="4038600" y="5817638"/>
+            <a:ext cx="4114800" cy="903838"/>
+          </a:xfrm>
+        </p:spPr>
+        <p:txBody>
+          <a:bodyPr/>
+          <a:lstStyle/>
+          <a:p>
+            <a:r>
+              <a:rPr lang="en-US" b="1" dirty="0"/>
+              <a:t>Sources: </a:t>
+            </a:r>
+          </a:p>
+          <a:p>
+            <a:r>
+              <a:rPr lang="en-US" dirty="0">
+                <a:hlinkClick r:id="rId2"/>
+              </a:rPr>
+              <a:t>https://www.sitepoint.com/mvc-design-pattern-javascript/</a:t>
+            </a:r>
+            <a:endParaRPr lang="en-US" dirty="0"/>
+          </a:p>
+          <a:p>
+            <a:r>
+              <a:rPr lang="en-US" dirty="0">
+                <a:hlinkClick r:id="rId3"/>
+              </a:rPr>
+              <a:t>https://www.taniarascia.com/javascript-mvc-todo-app/</a:t>
+            </a:r>
+            <a:endParaRPr lang="en-US" dirty="0"/>
+          </a:p>
+        </p:txBody>
+      </p:sp>
+    </p:spTree>
+    <p:extLst>
+      <p:ext uri="{BB962C8B-B14F-4D97-AF65-F5344CB8AC3E}">
+        <p14:creationId xmlns:p14="http://schemas.microsoft.com/office/powerpoint/2010/main" val="3168997921"/>
+      </p:ext>
+    </p:extLst>
+  </p:cSld>
+  <p:clrMapOvr>
+    <a:masterClrMapping/>
+  </p:clrMapOvr>
+</p:sld>
+</file>
+
+<file path=ppt/slides/slide7.xml><?xml version="1.0" encoding="utf-8"?>
+<p:sld xmlns:a="http://schemas.openxmlformats.org/drawingml/2006/main" xmlns:r="http://schemas.openxmlformats.org/officeDocument/2006/relationships" xmlns:p="http://schemas.openxmlformats.org/presentationml/2006/main">
+  <p:cSld>
+    <p:spTree>
+      <p:nvGrpSpPr>
+        <p:cNvPr id="1" name=""/>
+        <p:cNvGrpSpPr/>
+        <p:nvPr/>
+      </p:nvGrpSpPr>
+      <p:grpSpPr>
+        <a:xfrm>
+          <a:off x="0" y="0"/>
+          <a:ext cx="0" cy="0"/>
+          <a:chOff x="0" y="0"/>
+          <a:chExt cx="0" cy="0"/>
+        </a:xfrm>
+      </p:grpSpPr>
+      <p:sp>
+        <p:nvSpPr>
+          <p:cNvPr id="2" name="Title 1">
+            <a:extLst>
+              <a:ext uri="{FF2B5EF4-FFF2-40B4-BE49-F238E27FC236}">
+                <a16:creationId xmlns:a16="http://schemas.microsoft.com/office/drawing/2014/main" id="{BEE2C759-AD0A-4069-AF7C-A04E554A3882}"/>
+              </a:ext>
+            </a:extLst>
+          </p:cNvPr>
+          <p:cNvSpPr>
+            <a:spLocks noGrp="1"/>
+          </p:cNvSpPr>
+          <p:nvPr>
+            <p:ph type="title"/>
+          </p:nvPr>
+        </p:nvSpPr>
+        <p:spPr/>
+        <p:txBody>
+          <a:bodyPr/>
+          <a:lstStyle/>
+          <a:p>
+            <a:r>
+              <a:rPr lang="en-US" dirty="0"/>
+              <a:t>The Model</a:t>
+            </a:r>
+          </a:p>
+        </p:txBody>
+      </p:sp>
+      <p:sp>
+        <p:nvSpPr>
+          <p:cNvPr id="3" name="Content Placeholder 2">
+            <a:extLst>
+              <a:ext uri="{FF2B5EF4-FFF2-40B4-BE49-F238E27FC236}">
+                <a16:creationId xmlns:a16="http://schemas.microsoft.com/office/drawing/2014/main" id="{E57CF8F8-AE55-4E52-8740-250B602A2AD5}"/>
+              </a:ext>
+            </a:extLst>
+          </p:cNvPr>
+          <p:cNvSpPr>
+            <a:spLocks noGrp="1"/>
+          </p:cNvSpPr>
+          <p:nvPr>
+            <p:ph idx="1"/>
+          </p:nvPr>
+        </p:nvSpPr>
+        <p:spPr/>
+        <p:txBody>
+          <a:bodyPr>
+            <a:normAutofit/>
+          </a:bodyPr>
+          <a:lstStyle/>
+          <a:p>
+            <a:r>
+              <a:rPr lang="en-US" dirty="0"/>
+              <a:t>Cares about data. In client-side JavaScript, this usually means Ajax and its helper functions</a:t>
+            </a:r>
+          </a:p>
+          <a:p>
+            <a:r>
+              <a:rPr lang="en-US" dirty="0"/>
+              <a:t>the ‘</a:t>
+            </a:r>
+            <a:r>
+              <a:rPr lang="en-US" dirty="0" err="1"/>
+              <a:t>todos</a:t>
+            </a:r>
+            <a:r>
+              <a:rPr lang="en-US" dirty="0"/>
+              <a:t>’, and the methods that will add, edit, or delete them.</a:t>
+            </a:r>
+          </a:p>
+          <a:p>
+            <a:r>
+              <a:rPr lang="en-US" dirty="0"/>
+              <a:t>In our example these are functions that manipulate local storage in the browser (the ‘</a:t>
+            </a:r>
+            <a:r>
+              <a:rPr lang="en-US" dirty="0" err="1"/>
+              <a:t>todos</a:t>
+            </a:r>
+            <a:r>
+              <a:rPr lang="en-US" dirty="0"/>
+              <a:t>’, and the methods that will add, edit, or delete them.)</a:t>
+            </a:r>
+          </a:p>
+          <a:p>
+            <a:r>
+              <a:rPr lang="en-US" dirty="0"/>
+              <a:t>The model only deals with the actual data and modifying that data. It doesn't understand or have any knowledge the </a:t>
+            </a:r>
+            <a:r>
+              <a:rPr lang="en-US" b="1" dirty="0"/>
+              <a:t>input</a:t>
+            </a:r>
+            <a:r>
+              <a:rPr lang="en-US" dirty="0"/>
+              <a:t> - what's modifying it, or the </a:t>
+            </a:r>
+            <a:r>
+              <a:rPr lang="en-US" b="1" dirty="0"/>
+              <a:t>output</a:t>
+            </a:r>
+            <a:r>
+              <a:rPr lang="en-US" dirty="0"/>
+              <a:t> - what will end up displaying.</a:t>
+            </a:r>
+          </a:p>
+        </p:txBody>
+      </p:sp>
+      <p:sp>
+        <p:nvSpPr>
+          <p:cNvPr id="4" name="Footer Placeholder 3">
+            <a:extLst>
+              <a:ext uri="{FF2B5EF4-FFF2-40B4-BE49-F238E27FC236}">
+                <a16:creationId xmlns:a16="http://schemas.microsoft.com/office/drawing/2014/main" id="{14C9D926-6277-4A6F-A138-71C83466A977}"/>
+              </a:ext>
+            </a:extLst>
+          </p:cNvPr>
+          <p:cNvSpPr>
+            <a:spLocks noGrp="1"/>
+          </p:cNvSpPr>
+          <p:nvPr>
+            <p:ph type="ftr" sz="quarter" idx="11"/>
+          </p:nvPr>
+        </p:nvSpPr>
+        <p:spPr>
+          <a:xfrm>
+            <a:off x="4038600" y="6127750"/>
+            <a:ext cx="4114800" cy="365125"/>
+          </a:xfrm>
+        </p:spPr>
+        <p:txBody>
+          <a:bodyPr/>
+          <a:lstStyle/>
+          <a:p>
+            <a:r>
+              <a:rPr lang="en-US" b="1" dirty="0"/>
+              <a:t>Sources: </a:t>
+            </a:r>
+          </a:p>
+          <a:p>
+            <a:r>
+              <a:rPr lang="en-US" dirty="0">
+                <a:hlinkClick r:id="rId2"/>
+              </a:rPr>
+              <a:t>https://www.sitepoint.com/mvc-design-pattern-javascript/</a:t>
+            </a:r>
+            <a:endParaRPr lang="en-US" dirty="0"/>
+          </a:p>
+          <a:p>
+            <a:r>
+              <a:rPr lang="en-US" dirty="0">
+                <a:hlinkClick r:id="rId3"/>
+              </a:rPr>
+              <a:t>https://www.taniarascia.com/javascript-mvc-todo-app/</a:t>
+            </a:r>
+            <a:endParaRPr lang="en-US" dirty="0"/>
+          </a:p>
+        </p:txBody>
+      </p:sp>
+    </p:spTree>
+    <p:extLst>
+      <p:ext uri="{BB962C8B-B14F-4D97-AF65-F5344CB8AC3E}">
+        <p14:creationId xmlns:p14="http://schemas.microsoft.com/office/powerpoint/2010/main" val="43632711"/>
       </p:ext>
     </p:extLst>
   </p:cSld>
@@ -4132,4 +5246,299 @@
     </a:ext>
   </a:extLst>
 </a:theme>
+</file>
+
+<file path=ppt/theme/theme2.xml><?xml version="1.0" encoding="utf-8"?>
+<a:theme xmlns:a="http://schemas.openxmlformats.org/drawingml/2006/main" name="Office Theme">
+  <a:themeElements>
+    <a:clrScheme name="Office">
+      <a:dk1>
+        <a:sysClr val="windowText" lastClr="000000"/>
+      </a:dk1>
+      <a:lt1>
+        <a:sysClr val="window" lastClr="FFFFFF"/>
+      </a:lt1>
+      <a:dk2>
+        <a:srgbClr val="44546A"/>
+      </a:dk2>
+      <a:lt2>
+        <a:srgbClr val="E7E6E6"/>
+      </a:lt2>
+      <a:accent1>
+        <a:srgbClr val="4472C4"/>
+      </a:accent1>
+      <a:accent2>
+        <a:srgbClr val="ED7D31"/>
+      </a:accent2>
+      <a:accent3>
+        <a:srgbClr val="A5A5A5"/>
+      </a:accent3>
+      <a:accent4>
+        <a:srgbClr val="FFC000"/>
+      </a:accent4>
+      <a:accent5>
+        <a:srgbClr val="5B9BD5"/>
+      </a:accent5>
+      <a:accent6>
+        <a:srgbClr val="70AD47"/>
+      </a:accent6>
+      <a:hlink>
+        <a:srgbClr val="0563C1"/>
+      </a:hlink>
+      <a:folHlink>
+        <a:srgbClr val="954F72"/>
+      </a:folHlink>
+    </a:clrScheme>
+    <a:fontScheme name="Office">
+      <a:majorFont>
+        <a:latin typeface="Calibri Light" panose="020F0302020204030204"/>
+        <a:ea typeface=""/>
+        <a:cs typeface=""/>
+        <a:font script="Jpan" typeface="游ゴシック Light"/>
+        <a:font script="Hang" typeface="맑은 고딕"/>
+        <a:font script="Hans" typeface="等线 Light"/>
+        <a:font script="Hant" typeface="新細明體"/>
+        <a:font script="Arab" typeface="Times New Roman"/>
+        <a:font script="Hebr" typeface="Times New Roman"/>
+        <a:font script="Thai" typeface="Angsana New"/>
+        <a:font script="Ethi" typeface="Nyala"/>
+        <a:font script="Beng" typeface="Vrinda"/>
+        <a:font script="Gujr" typeface="Shruti"/>
+        <a:font script="Khmr" typeface="MoolBoran"/>
+        <a:font script="Knda" typeface="Tunga"/>
+        <a:font script="Guru" typeface="Raavi"/>
+        <a:font script="Cans" typeface="Euphemia"/>
+        <a:font script="Cher" typeface="Plantagenet Cherokee"/>
+        <a:font script="Yiii" typeface="Microsoft Yi Baiti"/>
+        <a:font script="Tibt" typeface="Microsoft Himalaya"/>
+        <a:font script="Thaa" typeface="MV Boli"/>
+        <a:font script="Deva" typeface="Mangal"/>
+        <a:font script="Telu" typeface="Gautami"/>
+        <a:font script="Taml" typeface="Latha"/>
+        <a:font script="Syrc" typeface="Estrangelo Edessa"/>
+        <a:font script="Orya" typeface="Kalinga"/>
+        <a:font script="Mlym" typeface="Kartika"/>
+        <a:font script="Laoo" typeface="DokChampa"/>
+        <a:font script="Sinh" typeface="Iskoola Pota"/>
+        <a:font script="Mong" typeface="Mongolian Baiti"/>
+        <a:font script="Viet" typeface="Times New Roman"/>
+        <a:font script="Uigh" typeface="Microsoft Uighur"/>
+        <a:font script="Geor" typeface="Sylfaen"/>
+        <a:font script="Armn" typeface="Arial"/>
+        <a:font script="Bugi" typeface="Leelawadee UI"/>
+        <a:font script="Bopo" typeface="Microsoft JhengHei"/>
+        <a:font script="Java" typeface="Javanese Text"/>
+        <a:font script="Lisu" typeface="Segoe UI"/>
+        <a:font script="Mymr" typeface="Myanmar Text"/>
+        <a:font script="Nkoo" typeface="Ebrima"/>
+        <a:font script="Olck" typeface="Nirmala UI"/>
+        <a:font script="Osma" typeface="Ebrima"/>
+        <a:font script="Phag" typeface="Phagspa"/>
+        <a:font script="Syrn" typeface="Estrangelo Edessa"/>
+        <a:font script="Syrj" typeface="Estrangelo Edessa"/>
+        <a:font script="Syre" typeface="Estrangelo Edessa"/>
+        <a:font script="Sora" typeface="Nirmala UI"/>
+        <a:font script="Tale" typeface="Microsoft Tai Le"/>
+        <a:font script="Talu" typeface="Microsoft New Tai Lue"/>
+        <a:font script="Tfng" typeface="Ebrima"/>
+      </a:majorFont>
+      <a:minorFont>
+        <a:latin typeface="Calibri" panose="020F0502020204030204"/>
+        <a:ea typeface=""/>
+        <a:cs typeface=""/>
+        <a:font script="Jpan" typeface="游ゴシック"/>
+        <a:font script="Hang" typeface="맑은 고딕"/>
+        <a:font script="Hans" typeface="等线"/>
+        <a:font script="Hant" typeface="新細明體"/>
+        <a:font script="Arab" typeface="Arial"/>
+        <a:font script="Hebr" typeface="Arial"/>
+        <a:font script="Thai" typeface="Cordia New"/>
+        <a:font script="Ethi" typeface="Nyala"/>
+        <a:font script="Beng" typeface="Vrinda"/>
+        <a:font script="Gujr" typeface="Shruti"/>
+        <a:font script="Khmr" typeface="DaunPenh"/>
+        <a:font script="Knda" typeface="Tunga"/>
+        <a:font script="Guru" typeface="Raavi"/>
+        <a:font script="Cans" typeface="Euphemia"/>
+        <a:font script="Cher" typeface="Plantagenet Cherokee"/>
+        <a:font script="Yiii" typeface="Microsoft Yi Baiti"/>
+        <a:font script="Tibt" typeface="Microsoft Himalaya"/>
+        <a:font script="Thaa" typeface="MV Boli"/>
+        <a:font script="Deva" typeface="Mangal"/>
+        <a:font script="Telu" typeface="Gautami"/>
+        <a:font script="Taml" typeface="Latha"/>
+        <a:font script="Syrc" typeface="Estrangelo Edessa"/>
+        <a:font script="Orya" typeface="Kalinga"/>
+        <a:font script="Mlym" typeface="Kartika"/>
+        <a:font script="Laoo" typeface="DokChampa"/>
+        <a:font script="Sinh" typeface="Iskoola Pota"/>
+        <a:font script="Mong" typeface="Mongolian Baiti"/>
+        <a:font script="Viet" typeface="Arial"/>
+        <a:font script="Uigh" typeface="Microsoft Uighur"/>
+        <a:font script="Geor" typeface="Sylfaen"/>
+        <a:font script="Armn" typeface="Arial"/>
+        <a:font script="Bugi" typeface="Leelawadee UI"/>
+        <a:font script="Bopo" typeface="Microsoft JhengHei"/>
+        <a:font script="Java" typeface="Javanese Text"/>
+        <a:font script="Lisu" typeface="Segoe UI"/>
+        <a:font script="Mymr" typeface="Myanmar Text"/>
+        <a:font script="Nkoo" typeface="Ebrima"/>
+        <a:font script="Olck" typeface="Nirmala UI"/>
+        <a:font script="Osma" typeface="Ebrima"/>
+        <a:font script="Phag" typeface="Phagspa"/>
+        <a:font script="Syrn" typeface="Estrangelo Edessa"/>
+        <a:font script="Syrj" typeface="Estrangelo Edessa"/>
+        <a:font script="Syre" typeface="Estrangelo Edessa"/>
+        <a:font script="Sora" typeface="Nirmala UI"/>
+        <a:font script="Tale" typeface="Microsoft Tai Le"/>
+        <a:font script="Talu" typeface="Microsoft New Tai Lue"/>
+        <a:font script="Tfng" typeface="Ebrima"/>
+      </a:minorFont>
+    </a:fontScheme>
+    <a:fmtScheme name="Office">
+      <a:fillStyleLst>
+        <a:solidFill>
+          <a:schemeClr val="phClr"/>
+        </a:solidFill>
+        <a:gradFill rotWithShape="1">
+          <a:gsLst>
+            <a:gs pos="0">
+              <a:schemeClr val="phClr">
+                <a:lumMod val="110000"/>
+                <a:satMod val="105000"/>
+                <a:tint val="67000"/>
+              </a:schemeClr>
+            </a:gs>
+            <a:gs pos="50000">
+              <a:schemeClr val="phClr">
+                <a:lumMod val="105000"/>
+                <a:satMod val="103000"/>
+                <a:tint val="73000"/>
+              </a:schemeClr>
+            </a:gs>
+            <a:gs pos="100000">
+              <a:schemeClr val="phClr">
+                <a:lumMod val="105000"/>
+                <a:satMod val="109000"/>
+                <a:tint val="81000"/>
+              </a:schemeClr>
+            </a:gs>
+          </a:gsLst>
+          <a:lin ang="5400000" scaled="0"/>
+        </a:gradFill>
+        <a:gradFill rotWithShape="1">
+          <a:gsLst>
+            <a:gs pos="0">
+              <a:schemeClr val="phClr">
+                <a:satMod val="103000"/>
+                <a:lumMod val="102000"/>
+                <a:tint val="94000"/>
+              </a:schemeClr>
+            </a:gs>
+            <a:gs pos="50000">
+              <a:schemeClr val="phClr">
+                <a:satMod val="110000"/>
+                <a:lumMod val="100000"/>
+                <a:shade val="100000"/>
+              </a:schemeClr>
+            </a:gs>
+            <a:gs pos="100000">
+              <a:schemeClr val="phClr">
+                <a:lumMod val="99000"/>
+                <a:satMod val="120000"/>
+                <a:shade val="78000"/>
+              </a:schemeClr>
+            </a:gs>
+          </a:gsLst>
+          <a:lin ang="5400000" scaled="0"/>
+        </a:gradFill>
+      </a:fillStyleLst>
+      <a:lnStyleLst>
+        <a:ln w="6350" cap="flat" cmpd="sng" algn="ctr">
+          <a:solidFill>
+            <a:schemeClr val="phClr"/>
+          </a:solidFill>
+          <a:prstDash val="solid"/>
+          <a:miter lim="800000"/>
+        </a:ln>
+        <a:ln w="12700" cap="flat" cmpd="sng" algn="ctr">
+          <a:solidFill>
+            <a:schemeClr val="phClr"/>
+          </a:solidFill>
+          <a:prstDash val="solid"/>
+          <a:miter lim="800000"/>
+        </a:ln>
+        <a:ln w="19050" cap="flat" cmpd="sng" algn="ctr">
+          <a:solidFill>
+            <a:schemeClr val="phClr"/>
+          </a:solidFill>
+          <a:prstDash val="solid"/>
+          <a:miter lim="800000"/>
+        </a:ln>
+      </a:lnStyleLst>
+      <a:effectStyleLst>
+        <a:effectStyle>
+          <a:effectLst/>
+        </a:effectStyle>
+        <a:effectStyle>
+          <a:effectLst/>
+        </a:effectStyle>
+        <a:effectStyle>
+          <a:effectLst>
+            <a:outerShdw blurRad="57150" dist="19050" dir="5400000" algn="ctr" rotWithShape="0">
+              <a:srgbClr val="000000">
+                <a:alpha val="63000"/>
+              </a:srgbClr>
+            </a:outerShdw>
+          </a:effectLst>
+        </a:effectStyle>
+      </a:effectStyleLst>
+      <a:bgFillStyleLst>
+        <a:solidFill>
+          <a:schemeClr val="phClr"/>
+        </a:solidFill>
+        <a:solidFill>
+          <a:schemeClr val="phClr">
+            <a:tint val="95000"/>
+            <a:satMod val="170000"/>
+          </a:schemeClr>
+        </a:solidFill>
+        <a:gradFill rotWithShape="1">
+          <a:gsLst>
+            <a:gs pos="0">
+              <a:schemeClr val="phClr">
+                <a:tint val="93000"/>
+                <a:satMod val="150000"/>
+                <a:shade val="98000"/>
+                <a:lumMod val="102000"/>
+              </a:schemeClr>
+            </a:gs>
+            <a:gs pos="50000">
+              <a:schemeClr val="phClr">
+                <a:tint val="98000"/>
+                <a:satMod val="130000"/>
+                <a:shade val="90000"/>
+                <a:lumMod val="103000"/>
+              </a:schemeClr>
+            </a:gs>
+            <a:gs pos="100000">
+              <a:schemeClr val="phClr">
+                <a:shade val="63000"/>
+                <a:satMod val="120000"/>
+              </a:schemeClr>
+            </a:gs>
+          </a:gsLst>
+          <a:lin ang="5400000" scaled="0"/>
+        </a:gradFill>
+      </a:bgFillStyleLst>
+    </a:fmtScheme>
+  </a:themeElements>
+  <a:objectDefaults/>
+  <a:extraClrSchemeLst/>
+  <a:extLst>
+    <a:ext uri="{05A4C25C-085E-4340-85A3-A5531E510DB2}">
+      <thm15:themeFamily xmlns:thm15="http://schemas.microsoft.com/office/thememl/2012/main" name="Office Theme" id="{62F939B6-93AF-4DB8-9C6B-D6C7DFDC589F}" vid="{4A3C46E8-61CC-4603-A589-7422A47A8E4A}"/>
+    </a:ext>
+  </a:extLst>
+</a:theme>
 </file>
</xml_diff>